<commit_message>
Stage updates to URI alias, agenda changes, and file updates.
</commit_message>
<xml_diff>
--- a/assets/files/iaaf/2025/IAAF-2025-GSA-Yearly-Activities-Update.pptx
+++ b/assets/files/iaaf/2025/IAAF-2025-GSA-Yearly-Activities-Update.pptx
@@ -36,12 +36,12 @@
   <p:notesSz cx="7010400" cy="9296400"/>
   <p:embeddedFontLst>
     <p:embeddedFont>
-      <p:font typeface="Oswald SemiBold" panose="00000700000000000000" pitchFamily="2" charset="0"/>
+      <p:font typeface="Oswald SemiBold" panose="020F0502020204030204" pitchFamily="34" charset="0"/>
       <p:regular r:id="rId26"/>
       <p:bold r:id="rId27"/>
     </p:embeddedFont>
     <p:embeddedFont>
-      <p:font typeface="Public Sans" pitchFamily="2" charset="0"/>
+      <p:font typeface="Public Sans" pitchFamily="2" charset="77"/>
       <p:regular r:id="rId28"/>
       <p:bold r:id="rId29"/>
       <p:italic r:id="rId30"/>
@@ -314,7 +314,7 @@
       </p15:notesGuideLst>
     </p:ext>
     <p:ext uri="GoogleSlidesCustomDataVersion2">
-      <go:slidesCustomData xmlns:go="http://customooxmlschemas.google.com/" xmlns:ahyp="http://schemas.microsoft.com/office/drawing/2018/hyperlinkcolor" xmlns:p15="http://schemas.microsoft.com/office/powerpoint/2012/main" xmlns:p14="http://schemas.microsoft.com/office/powerpoint/2010/main" xmlns:com="http://schemas.openxmlformats.org/drawingml/2006/compatibility" xmlns:pvml="urn:schemas-microsoft-com:office:powerpoint" xmlns:v="urn:schemas-microsoft-com:vml" xmlns:o="urn:schemas-microsoft-com:office:office" xmlns:dgm="http://schemas.openxmlformats.org/drawingml/2006/diagram" xmlns:c="http://schemas.openxmlformats.org/drawingml/2006/chart" xmlns:mv="urn:schemas-microsoft-com:mac:vml" xmlns:mc="http://schemas.openxmlformats.org/markup-compatibility/2006" xmlns="" r:id="rId40" roundtripDataSignature="AMtx7miF+3UW4MypuNdxj5L3bcuupiMsCQ=="/>
+      <go:slidesCustomData xmlns="" xmlns:mc="http://schemas.openxmlformats.org/markup-compatibility/2006" xmlns:mv="urn:schemas-microsoft-com:mac:vml" xmlns:c="http://schemas.openxmlformats.org/drawingml/2006/chart" xmlns:dgm="http://schemas.openxmlformats.org/drawingml/2006/diagram" xmlns:o="urn:schemas-microsoft-com:office:office" xmlns:v="urn:schemas-microsoft-com:vml" xmlns:pvml="urn:schemas-microsoft-com:office:powerpoint" xmlns:com="http://schemas.openxmlformats.org/drawingml/2006/compatibility" xmlns:p14="http://schemas.microsoft.com/office/powerpoint/2010/main" xmlns:p15="http://schemas.microsoft.com/office/powerpoint/2012/main" xmlns:ahyp="http://schemas.microsoft.com/office/drawing/2018/hyperlinkcolor" xmlns:go="http://customooxmlschemas.google.com/" r:id="rId40" roundtripDataSignature="AMtx7miF+3UW4MypuNdxj5L3bcuupiMsCQ=="/>
     </p:ext>
   </p:extLst>
 </p:presentation>
@@ -10902,7 +10902,19 @@
                   <a:cs typeface="Oswald SemiBold"/>
                   <a:sym typeface="Oswald SemiBold"/>
                 </a:rPr>
-                <a:t>.gov/</a:t>
+                <a:t>.</a:t>
+              </a:r>
+              <a:r>
+                <a:rPr lang="en-US" sz="2500" b="0" i="0" u="none" strike="noStrike" cap="none">
+                  <a:solidFill>
+                    <a:schemeClr val="dk2"/>
+                  </a:solidFill>
+                  <a:latin typeface="Oswald SemiBold"/>
+                  <a:ea typeface="Oswald SemiBold"/>
+                  <a:cs typeface="Oswald SemiBold"/>
+                  <a:sym typeface="Oswald SemiBold"/>
+                </a:rPr>
+                <a:t>gov/alternative-text/</a:t>
               </a:r>
               <a:endParaRPr sz="2500" b="0" i="0" u="none" strike="noStrike" cap="none" dirty="0">
                 <a:solidFill>

</xml_diff>

<commit_message>
Stage updates to URI alias, agenda changes, and file updates. (#1115)
</commit_message>
<xml_diff>
--- a/assets/files/iaaf/2025/IAAF-2025-GSA-Yearly-Activities-Update.pptx
+++ b/assets/files/iaaf/2025/IAAF-2025-GSA-Yearly-Activities-Update.pptx
@@ -36,12 +36,12 @@
   <p:notesSz cx="7010400" cy="9296400"/>
   <p:embeddedFontLst>
     <p:embeddedFont>
-      <p:font typeface="Oswald SemiBold" panose="00000700000000000000" pitchFamily="2" charset="0"/>
+      <p:font typeface="Oswald SemiBold" panose="020F0502020204030204" pitchFamily="34" charset="0"/>
       <p:regular r:id="rId26"/>
       <p:bold r:id="rId27"/>
     </p:embeddedFont>
     <p:embeddedFont>
-      <p:font typeface="Public Sans" pitchFamily="2" charset="0"/>
+      <p:font typeface="Public Sans" pitchFamily="2" charset="77"/>
       <p:regular r:id="rId28"/>
       <p:bold r:id="rId29"/>
       <p:italic r:id="rId30"/>
@@ -314,7 +314,7 @@
       </p15:notesGuideLst>
     </p:ext>
     <p:ext uri="GoogleSlidesCustomDataVersion2">
-      <go:slidesCustomData xmlns:go="http://customooxmlschemas.google.com/" xmlns:ahyp="http://schemas.microsoft.com/office/drawing/2018/hyperlinkcolor" xmlns:p15="http://schemas.microsoft.com/office/powerpoint/2012/main" xmlns:p14="http://schemas.microsoft.com/office/powerpoint/2010/main" xmlns:com="http://schemas.openxmlformats.org/drawingml/2006/compatibility" xmlns:pvml="urn:schemas-microsoft-com:office:powerpoint" xmlns:v="urn:schemas-microsoft-com:vml" xmlns:o="urn:schemas-microsoft-com:office:office" xmlns:dgm="http://schemas.openxmlformats.org/drawingml/2006/diagram" xmlns:c="http://schemas.openxmlformats.org/drawingml/2006/chart" xmlns:mv="urn:schemas-microsoft-com:mac:vml" xmlns:mc="http://schemas.openxmlformats.org/markup-compatibility/2006" xmlns="" r:id="rId40" roundtripDataSignature="AMtx7miF+3UW4MypuNdxj5L3bcuupiMsCQ=="/>
+      <go:slidesCustomData xmlns="" xmlns:mc="http://schemas.openxmlformats.org/markup-compatibility/2006" xmlns:mv="urn:schemas-microsoft-com:mac:vml" xmlns:c="http://schemas.openxmlformats.org/drawingml/2006/chart" xmlns:dgm="http://schemas.openxmlformats.org/drawingml/2006/diagram" xmlns:o="urn:schemas-microsoft-com:office:office" xmlns:v="urn:schemas-microsoft-com:vml" xmlns:pvml="urn:schemas-microsoft-com:office:powerpoint" xmlns:com="http://schemas.openxmlformats.org/drawingml/2006/compatibility" xmlns:p14="http://schemas.microsoft.com/office/powerpoint/2010/main" xmlns:p15="http://schemas.microsoft.com/office/powerpoint/2012/main" xmlns:ahyp="http://schemas.microsoft.com/office/drawing/2018/hyperlinkcolor" xmlns:go="http://customooxmlschemas.google.com/" r:id="rId40" roundtripDataSignature="AMtx7miF+3UW4MypuNdxj5L3bcuupiMsCQ=="/>
     </p:ext>
   </p:extLst>
 </p:presentation>
@@ -10902,7 +10902,19 @@
                   <a:cs typeface="Oswald SemiBold"/>
                   <a:sym typeface="Oswald SemiBold"/>
                 </a:rPr>
-                <a:t>.gov/</a:t>
+                <a:t>.</a:t>
+              </a:r>
+              <a:r>
+                <a:rPr lang="en-US" sz="2500" b="0" i="0" u="none" strike="noStrike" cap="none">
+                  <a:solidFill>
+                    <a:schemeClr val="dk2"/>
+                  </a:solidFill>
+                  <a:latin typeface="Oswald SemiBold"/>
+                  <a:ea typeface="Oswald SemiBold"/>
+                  <a:cs typeface="Oswald SemiBold"/>
+                  <a:sym typeface="Oswald SemiBold"/>
+                </a:rPr>
+                <a:t>gov/alternative-text/</a:t>
               </a:r>
               <a:endParaRPr sz="2500" b="0" i="0" u="none" strike="noStrike" cap="none" dirty="0">
                 <a:solidFill>

</xml_diff>